<commit_message>
Updating presentation with resources slide
</commit_message>
<xml_diff>
--- a/Gdg-Go-Presentaiton.pptx
+++ b/Gdg-Go-Presentaiton.pptx
@@ -13,6 +13,7 @@
     <p:sldId id="258" r:id="rId10"/>
     <p:sldId id="259" r:id="rId11"/>
     <p:sldId id="260" r:id="rId12"/>
+    <p:sldId id="261" r:id="rId13"/>
   </p:sldIdLst>
   <p:sldSz cx="13004800" cy="9753600"/>
   <p:notesSz cx="6858000" cy="9144000"/>
@@ -67,13 +68,13 @@
         </a:solidFill>
         <a:effectLst/>
         <a:uFillTx/>
-        <a:latin typeface="+mn-lt"/>
-        <a:ea typeface="+mn-ea"/>
-        <a:cs typeface="+mn-cs"/>
+        <a:latin typeface="Helvetica Light"/>
+        <a:ea typeface="Helvetica Light"/>
+        <a:cs typeface="Helvetica Light"/>
         <a:sym typeface="Helvetica Light"/>
       </a:defRPr>
     </a:lvl1pPr>
-    <a:lvl2pPr marL="0" marR="0" indent="228600" algn="ctr" defTabSz="584200" rtl="0" fontAlgn="auto" latinLnBrk="0" hangingPunct="0">
+    <a:lvl2pPr marL="0" marR="0" indent="0" algn="ctr" defTabSz="584200" rtl="0" fontAlgn="auto" latinLnBrk="0" hangingPunct="0">
       <a:lnSpc>
         <a:spcPct val="100000"/>
       </a:lnSpc>
@@ -97,13 +98,13 @@
         </a:solidFill>
         <a:effectLst/>
         <a:uFillTx/>
-        <a:latin typeface="+mn-lt"/>
-        <a:ea typeface="+mn-ea"/>
-        <a:cs typeface="+mn-cs"/>
+        <a:latin typeface="Helvetica Light"/>
+        <a:ea typeface="Helvetica Light"/>
+        <a:cs typeface="Helvetica Light"/>
         <a:sym typeface="Helvetica Light"/>
       </a:defRPr>
     </a:lvl2pPr>
-    <a:lvl3pPr marL="0" marR="0" indent="457200" algn="ctr" defTabSz="584200" rtl="0" fontAlgn="auto" latinLnBrk="0" hangingPunct="0">
+    <a:lvl3pPr marL="0" marR="0" indent="0" algn="ctr" defTabSz="584200" rtl="0" fontAlgn="auto" latinLnBrk="0" hangingPunct="0">
       <a:lnSpc>
         <a:spcPct val="100000"/>
       </a:lnSpc>
@@ -127,13 +128,13 @@
         </a:solidFill>
         <a:effectLst/>
         <a:uFillTx/>
-        <a:latin typeface="+mn-lt"/>
-        <a:ea typeface="+mn-ea"/>
-        <a:cs typeface="+mn-cs"/>
+        <a:latin typeface="Helvetica Light"/>
+        <a:ea typeface="Helvetica Light"/>
+        <a:cs typeface="Helvetica Light"/>
         <a:sym typeface="Helvetica Light"/>
       </a:defRPr>
     </a:lvl3pPr>
-    <a:lvl4pPr marL="0" marR="0" indent="685800" algn="ctr" defTabSz="584200" rtl="0" fontAlgn="auto" latinLnBrk="0" hangingPunct="0">
+    <a:lvl4pPr marL="0" marR="0" indent="0" algn="ctr" defTabSz="584200" rtl="0" fontAlgn="auto" latinLnBrk="0" hangingPunct="0">
       <a:lnSpc>
         <a:spcPct val="100000"/>
       </a:lnSpc>
@@ -157,13 +158,13 @@
         </a:solidFill>
         <a:effectLst/>
         <a:uFillTx/>
-        <a:latin typeface="+mn-lt"/>
-        <a:ea typeface="+mn-ea"/>
-        <a:cs typeface="+mn-cs"/>
+        <a:latin typeface="Helvetica Light"/>
+        <a:ea typeface="Helvetica Light"/>
+        <a:cs typeface="Helvetica Light"/>
         <a:sym typeface="Helvetica Light"/>
       </a:defRPr>
     </a:lvl4pPr>
-    <a:lvl5pPr marL="0" marR="0" indent="914400" algn="ctr" defTabSz="584200" rtl="0" fontAlgn="auto" latinLnBrk="0" hangingPunct="0">
+    <a:lvl5pPr marL="0" marR="0" indent="0" algn="ctr" defTabSz="584200" rtl="0" fontAlgn="auto" latinLnBrk="0" hangingPunct="0">
       <a:lnSpc>
         <a:spcPct val="100000"/>
       </a:lnSpc>
@@ -187,13 +188,13 @@
         </a:solidFill>
         <a:effectLst/>
         <a:uFillTx/>
-        <a:latin typeface="+mn-lt"/>
-        <a:ea typeface="+mn-ea"/>
-        <a:cs typeface="+mn-cs"/>
+        <a:latin typeface="Helvetica Light"/>
+        <a:ea typeface="Helvetica Light"/>
+        <a:cs typeface="Helvetica Light"/>
         <a:sym typeface="Helvetica Light"/>
       </a:defRPr>
     </a:lvl5pPr>
-    <a:lvl6pPr marL="0" marR="0" indent="1143000" algn="ctr" defTabSz="584200" rtl="0" fontAlgn="auto" latinLnBrk="0" hangingPunct="0">
+    <a:lvl6pPr marL="0" marR="0" indent="0" algn="ctr" defTabSz="584200" rtl="0" fontAlgn="auto" latinLnBrk="0" hangingPunct="0">
       <a:lnSpc>
         <a:spcPct val="100000"/>
       </a:lnSpc>
@@ -217,13 +218,13 @@
         </a:solidFill>
         <a:effectLst/>
         <a:uFillTx/>
-        <a:latin typeface="+mn-lt"/>
-        <a:ea typeface="+mn-ea"/>
-        <a:cs typeface="+mn-cs"/>
+        <a:latin typeface="Helvetica Light"/>
+        <a:ea typeface="Helvetica Light"/>
+        <a:cs typeface="Helvetica Light"/>
         <a:sym typeface="Helvetica Light"/>
       </a:defRPr>
     </a:lvl6pPr>
-    <a:lvl7pPr marL="0" marR="0" indent="1371600" algn="ctr" defTabSz="584200" rtl="0" fontAlgn="auto" latinLnBrk="0" hangingPunct="0">
+    <a:lvl7pPr marL="0" marR="0" indent="0" algn="ctr" defTabSz="584200" rtl="0" fontAlgn="auto" latinLnBrk="0" hangingPunct="0">
       <a:lnSpc>
         <a:spcPct val="100000"/>
       </a:lnSpc>
@@ -247,13 +248,13 @@
         </a:solidFill>
         <a:effectLst/>
         <a:uFillTx/>
-        <a:latin typeface="+mn-lt"/>
-        <a:ea typeface="+mn-ea"/>
-        <a:cs typeface="+mn-cs"/>
+        <a:latin typeface="Helvetica Light"/>
+        <a:ea typeface="Helvetica Light"/>
+        <a:cs typeface="Helvetica Light"/>
         <a:sym typeface="Helvetica Light"/>
       </a:defRPr>
     </a:lvl7pPr>
-    <a:lvl8pPr marL="0" marR="0" indent="1600200" algn="ctr" defTabSz="584200" rtl="0" fontAlgn="auto" latinLnBrk="0" hangingPunct="0">
+    <a:lvl8pPr marL="0" marR="0" indent="0" algn="ctr" defTabSz="584200" rtl="0" fontAlgn="auto" latinLnBrk="0" hangingPunct="0">
       <a:lnSpc>
         <a:spcPct val="100000"/>
       </a:lnSpc>
@@ -277,13 +278,13 @@
         </a:solidFill>
         <a:effectLst/>
         <a:uFillTx/>
-        <a:latin typeface="+mn-lt"/>
-        <a:ea typeface="+mn-ea"/>
-        <a:cs typeface="+mn-cs"/>
+        <a:latin typeface="Helvetica Light"/>
+        <a:ea typeface="Helvetica Light"/>
+        <a:cs typeface="Helvetica Light"/>
         <a:sym typeface="Helvetica Light"/>
       </a:defRPr>
     </a:lvl8pPr>
-    <a:lvl9pPr marL="0" marR="0" indent="1828800" algn="ctr" defTabSz="584200" rtl="0" fontAlgn="auto" latinLnBrk="0" hangingPunct="0">
+    <a:lvl9pPr marL="0" marR="0" indent="0" algn="ctr" defTabSz="584200" rtl="0" fontAlgn="auto" latinLnBrk="0" hangingPunct="0">
       <a:lnSpc>
         <a:spcPct val="100000"/>
       </a:lnSpc>
@@ -307,9 +308,9 @@
         </a:solidFill>
         <a:effectLst/>
         <a:uFillTx/>
-        <a:latin typeface="+mn-lt"/>
-        <a:ea typeface="+mn-ea"/>
-        <a:cs typeface="+mn-cs"/>
+        <a:latin typeface="Helvetica Light"/>
+        <a:ea typeface="Helvetica Light"/>
+        <a:cs typeface="Helvetica Light"/>
         <a:sym typeface="Helvetica Light"/>
       </a:defRPr>
     </a:lvl9pPr>
@@ -397,9 +398,9 @@
         <a:spcPct val="117999"/>
       </a:lnSpc>
       <a:defRPr sz="2200">
-        <a:latin typeface="Helvetica Neue"/>
-        <a:ea typeface="Helvetica Neue"/>
-        <a:cs typeface="Helvetica Neue"/>
+        <a:latin typeface="+mn-lt"/>
+        <a:ea typeface="+mn-ea"/>
+        <a:cs typeface="+mn-cs"/>
         <a:sym typeface="Helvetica Neue"/>
       </a:defRPr>
     </a:lvl1pPr>
@@ -408,9 +409,9 @@
         <a:spcPct val="117999"/>
       </a:lnSpc>
       <a:defRPr sz="2200">
-        <a:latin typeface="Helvetica Neue"/>
-        <a:ea typeface="Helvetica Neue"/>
-        <a:cs typeface="Helvetica Neue"/>
+        <a:latin typeface="+mn-lt"/>
+        <a:ea typeface="+mn-ea"/>
+        <a:cs typeface="+mn-cs"/>
         <a:sym typeface="Helvetica Neue"/>
       </a:defRPr>
     </a:lvl2pPr>
@@ -419,9 +420,9 @@
         <a:spcPct val="117999"/>
       </a:lnSpc>
       <a:defRPr sz="2200">
-        <a:latin typeface="Helvetica Neue"/>
-        <a:ea typeface="Helvetica Neue"/>
-        <a:cs typeface="Helvetica Neue"/>
+        <a:latin typeface="+mn-lt"/>
+        <a:ea typeface="+mn-ea"/>
+        <a:cs typeface="+mn-cs"/>
         <a:sym typeface="Helvetica Neue"/>
       </a:defRPr>
     </a:lvl3pPr>
@@ -430,9 +431,9 @@
         <a:spcPct val="117999"/>
       </a:lnSpc>
       <a:defRPr sz="2200">
-        <a:latin typeface="Helvetica Neue"/>
-        <a:ea typeface="Helvetica Neue"/>
-        <a:cs typeface="Helvetica Neue"/>
+        <a:latin typeface="+mn-lt"/>
+        <a:ea typeface="+mn-ea"/>
+        <a:cs typeface="+mn-cs"/>
         <a:sym typeface="Helvetica Neue"/>
       </a:defRPr>
     </a:lvl4pPr>
@@ -441,9 +442,9 @@
         <a:spcPct val="117999"/>
       </a:lnSpc>
       <a:defRPr sz="2200">
-        <a:latin typeface="Helvetica Neue"/>
-        <a:ea typeface="Helvetica Neue"/>
-        <a:cs typeface="Helvetica Neue"/>
+        <a:latin typeface="+mn-lt"/>
+        <a:ea typeface="+mn-ea"/>
+        <a:cs typeface="+mn-cs"/>
         <a:sym typeface="Helvetica Neue"/>
       </a:defRPr>
     </a:lvl5pPr>
@@ -452,9 +453,9 @@
         <a:spcPct val="117999"/>
       </a:lnSpc>
       <a:defRPr sz="2200">
-        <a:latin typeface="Helvetica Neue"/>
-        <a:ea typeface="Helvetica Neue"/>
-        <a:cs typeface="Helvetica Neue"/>
+        <a:latin typeface="+mn-lt"/>
+        <a:ea typeface="+mn-ea"/>
+        <a:cs typeface="+mn-cs"/>
         <a:sym typeface="Helvetica Neue"/>
       </a:defRPr>
     </a:lvl6pPr>
@@ -463,9 +464,9 @@
         <a:spcPct val="117999"/>
       </a:lnSpc>
       <a:defRPr sz="2200">
-        <a:latin typeface="Helvetica Neue"/>
-        <a:ea typeface="Helvetica Neue"/>
-        <a:cs typeface="Helvetica Neue"/>
+        <a:latin typeface="+mn-lt"/>
+        <a:ea typeface="+mn-ea"/>
+        <a:cs typeface="+mn-cs"/>
         <a:sym typeface="Helvetica Neue"/>
       </a:defRPr>
     </a:lvl7pPr>
@@ -474,9 +475,9 @@
         <a:spcPct val="117999"/>
       </a:lnSpc>
       <a:defRPr sz="2200">
-        <a:latin typeface="Helvetica Neue"/>
-        <a:ea typeface="Helvetica Neue"/>
-        <a:cs typeface="Helvetica Neue"/>
+        <a:latin typeface="+mn-lt"/>
+        <a:ea typeface="+mn-ea"/>
+        <a:cs typeface="+mn-cs"/>
         <a:sym typeface="Helvetica Neue"/>
       </a:defRPr>
     </a:lvl8pPr>
@@ -485,9 +486,9 @@
         <a:spcPct val="117999"/>
       </a:lnSpc>
       <a:defRPr sz="2200">
-        <a:latin typeface="Helvetica Neue"/>
-        <a:ea typeface="Helvetica Neue"/>
-        <a:cs typeface="Helvetica Neue"/>
+        <a:latin typeface="+mn-lt"/>
+        <a:ea typeface="+mn-ea"/>
+        <a:cs typeface="+mn-cs"/>
         <a:sym typeface="Helvetica Neue"/>
       </a:defRPr>
     </a:lvl9pPr>
@@ -568,7 +569,7 @@
               <a:buNone/>
               <a:defRPr sz="3200"/>
             </a:lvl1pPr>
-            <a:lvl2pPr marL="0" indent="228600" algn="ctr">
+            <a:lvl2pPr marL="0" indent="0" algn="ctr">
               <a:spcBef>
                 <a:spcPts val="0"/>
               </a:spcBef>
@@ -576,7 +577,7 @@
               <a:buNone/>
               <a:defRPr sz="3200"/>
             </a:lvl2pPr>
-            <a:lvl3pPr marL="0" indent="457200" algn="ctr">
+            <a:lvl3pPr marL="0" indent="0" algn="ctr">
               <a:spcBef>
                 <a:spcPts val="0"/>
               </a:spcBef>
@@ -584,7 +585,7 @@
               <a:buNone/>
               <a:defRPr sz="3200"/>
             </a:lvl3pPr>
-            <a:lvl4pPr marL="0" indent="685800" algn="ctr">
+            <a:lvl4pPr marL="0" indent="0" algn="ctr">
               <a:spcBef>
                 <a:spcPts val="0"/>
               </a:spcBef>
@@ -592,7 +593,7 @@
               <a:buNone/>
               <a:defRPr sz="3200"/>
             </a:lvl4pPr>
-            <a:lvl5pPr marL="0" indent="914400" algn="ctr">
+            <a:lvl5pPr marL="0" indent="0" algn="ctr">
               <a:spcBef>
                 <a:spcPts val="0"/>
               </a:spcBef>
@@ -686,7 +687,7 @@
           <p:cNvPr id="93" name="Shape 93"/>
           <p:cNvSpPr/>
           <p:nvPr>
-            <p:ph type="body" sz="quarter" idx="13"/>
+            <p:ph type="body" sz="quarter" idx="1"/>
           </p:nvPr>
         </p:nvSpPr>
         <p:spPr>
@@ -699,9 +700,7 @@
           </a:prstGeom>
         </p:spPr>
         <p:txBody>
-          <a:bodyPr anchor="t">
-            <a:spAutoFit/>
-          </a:bodyPr>
+          <a:bodyPr anchor="t"/>
           <a:lstStyle>
             <a:lvl1pPr marL="0" indent="0" algn="ctr">
               <a:spcBef>
@@ -711,11 +710,59 @@
               <a:buNone/>
               <a:defRPr sz="2400"/>
             </a:lvl1pPr>
+            <a:lvl2pPr marL="740833" indent="-296333" algn="ctr">
+              <a:spcBef>
+                <a:spcPts val="0"/>
+              </a:spcBef>
+              <a:defRPr sz="2400"/>
+            </a:lvl2pPr>
+            <a:lvl3pPr marL="1185333" indent="-296333" algn="ctr">
+              <a:spcBef>
+                <a:spcPts val="0"/>
+              </a:spcBef>
+              <a:defRPr sz="2400"/>
+            </a:lvl3pPr>
+            <a:lvl4pPr marL="1629833" indent="-296333" algn="ctr">
+              <a:spcBef>
+                <a:spcPts val="0"/>
+              </a:spcBef>
+              <a:defRPr sz="2400"/>
+            </a:lvl4pPr>
+            <a:lvl5pPr marL="2074333" indent="-296333" algn="ctr">
+              <a:spcBef>
+                <a:spcPts val="0"/>
+              </a:spcBef>
+              <a:defRPr sz="2400"/>
+            </a:lvl5pPr>
           </a:lstStyle>
           <a:p>
             <a:pPr/>
             <a:r>
-              <a:t>–Johnny Appleseed</a:t>
+              <a:t>Body Level One</a:t>
+            </a:r>
+          </a:p>
+          <a:p>
+            <a:pPr lvl="1"/>
+            <a:r>
+              <a:t>Body Level Two</a:t>
+            </a:r>
+          </a:p>
+          <a:p>
+            <a:pPr lvl="2"/>
+            <a:r>
+              <a:t>Body Level Three</a:t>
+            </a:r>
+          </a:p>
+          <a:p>
+            <a:pPr lvl="3"/>
+            <a:r>
+              <a:t>Body Level Four</a:t>
+            </a:r>
+          </a:p>
+          <a:p>
+            <a:pPr lvl="4"/>
+            <a:r>
+              <a:t>Body Level Five</a:t>
             </a:r>
           </a:p>
         </p:txBody>
@@ -725,7 +772,7 @@
           <p:cNvPr id="94" name="Shape 94"/>
           <p:cNvSpPr/>
           <p:nvPr>
-            <p:ph type="body" sz="quarter" idx="14"/>
+            <p:ph type="body" sz="quarter" idx="13"/>
           </p:nvPr>
         </p:nvSpPr>
         <p:spPr>
@@ -738,24 +785,17 @@
           </a:prstGeom>
         </p:spPr>
         <p:txBody>
-          <a:bodyPr>
-            <a:spAutoFit/>
-          </a:bodyPr>
-          <a:lstStyle>
-            <a:lvl1pPr marL="0" indent="0" algn="ctr">
+          <a:bodyPr/>
+          <a:lstStyle/>
+          <a:p>
+            <a:pPr marL="0" indent="0" algn="ctr">
               <a:spcBef>
                 <a:spcPts val="0"/>
               </a:spcBef>
               <a:buSzTx/>
               <a:buNone/>
               <a:defRPr sz="3800"/>
-            </a:lvl1pPr>
-          </a:lstStyle>
-          <a:p>
-            <a:pPr/>
-            <a:r>
-              <a:t>“Type a quote here.” </a:t>
-            </a:r>
+            </a:pPr>
           </a:p>
         </p:txBody>
       </p:sp>
@@ -1013,7 +1053,7 @@
               <a:buNone/>
               <a:defRPr sz="3200"/>
             </a:lvl1pPr>
-            <a:lvl2pPr marL="0" indent="228600" algn="ctr">
+            <a:lvl2pPr marL="0" indent="0" algn="ctr">
               <a:spcBef>
                 <a:spcPts val="0"/>
               </a:spcBef>
@@ -1021,7 +1061,7 @@
               <a:buNone/>
               <a:defRPr sz="3200"/>
             </a:lvl2pPr>
-            <a:lvl3pPr marL="0" indent="457200" algn="ctr">
+            <a:lvl3pPr marL="0" indent="0" algn="ctr">
               <a:spcBef>
                 <a:spcPts val="0"/>
               </a:spcBef>
@@ -1029,7 +1069,7 @@
               <a:buNone/>
               <a:defRPr sz="3200"/>
             </a:lvl3pPr>
-            <a:lvl4pPr marL="0" indent="685800" algn="ctr">
+            <a:lvl4pPr marL="0" indent="0" algn="ctr">
               <a:spcBef>
                 <a:spcPts val="0"/>
               </a:spcBef>
@@ -1037,7 +1077,7 @@
               <a:buNone/>
               <a:defRPr sz="3200"/>
             </a:lvl4pPr>
-            <a:lvl5pPr marL="0" indent="914400" algn="ctr">
+            <a:lvl5pPr marL="0" indent="0" algn="ctr">
               <a:spcBef>
                 <a:spcPts val="0"/>
               </a:spcBef>
@@ -1293,7 +1333,7 @@
               <a:buNone/>
               <a:defRPr sz="3200"/>
             </a:lvl1pPr>
-            <a:lvl2pPr marL="0" indent="228600" algn="ctr">
+            <a:lvl2pPr marL="0" indent="0" algn="ctr">
               <a:spcBef>
                 <a:spcPts val="0"/>
               </a:spcBef>
@@ -1301,7 +1341,7 @@
               <a:buNone/>
               <a:defRPr sz="3200"/>
             </a:lvl2pPr>
-            <a:lvl3pPr marL="0" indent="457200" algn="ctr">
+            <a:lvl3pPr marL="0" indent="0" algn="ctr">
               <a:spcBef>
                 <a:spcPts val="0"/>
               </a:spcBef>
@@ -1309,7 +1349,7 @@
               <a:buNone/>
               <a:defRPr sz="3200"/>
             </a:lvl3pPr>
-            <a:lvl4pPr marL="0" indent="685800" algn="ctr">
+            <a:lvl4pPr marL="0" indent="0" algn="ctr">
               <a:spcBef>
                 <a:spcPts val="0"/>
               </a:spcBef>
@@ -1317,7 +1357,7 @@
               <a:buNone/>
               <a:defRPr sz="3200"/>
             </a:lvl4pPr>
-            <a:lvl5pPr marL="0" indent="914400" algn="ctr">
+            <a:lvl5pPr marL="0" indent="0" algn="ctr">
               <a:spcBef>
                 <a:spcPts val="0"/>
               </a:spcBef>
@@ -1918,7 +1958,7 @@
         <p:spPr>
           <a:xfrm>
             <a:off x="6724518" y="889000"/>
-            <a:ext cx="5334001" cy="3771900"/>
+            <a:ext cx="5334002" cy="3771900"/>
           </a:xfrm>
           <a:prstGeom prst="rect">
             <a:avLst/>
@@ -2194,13 +2234,13 @@
             <a:srgbClr val="000000"/>
           </a:solidFill>
           <a:uFillTx/>
-          <a:latin typeface="+mn-lt"/>
-          <a:ea typeface="+mn-ea"/>
-          <a:cs typeface="+mn-cs"/>
+          <a:latin typeface="Helvetica Light"/>
+          <a:ea typeface="Helvetica Light"/>
+          <a:cs typeface="Helvetica Light"/>
           <a:sym typeface="Helvetica Light"/>
         </a:defRPr>
       </a:lvl1pPr>
-      <a:lvl2pPr marL="0" marR="0" indent="228600" algn="ctr" defTabSz="584200" rtl="0" latinLnBrk="0">
+      <a:lvl2pPr marL="0" marR="0" indent="0" algn="ctr" defTabSz="584200" rtl="0" latinLnBrk="0">
         <a:lnSpc>
           <a:spcPct val="100000"/>
         </a:lnSpc>
@@ -2223,13 +2263,13 @@
             <a:srgbClr val="000000"/>
           </a:solidFill>
           <a:uFillTx/>
-          <a:latin typeface="+mn-lt"/>
-          <a:ea typeface="+mn-ea"/>
-          <a:cs typeface="+mn-cs"/>
+          <a:latin typeface="Helvetica Light"/>
+          <a:ea typeface="Helvetica Light"/>
+          <a:cs typeface="Helvetica Light"/>
           <a:sym typeface="Helvetica Light"/>
         </a:defRPr>
       </a:lvl2pPr>
-      <a:lvl3pPr marL="0" marR="0" indent="457200" algn="ctr" defTabSz="584200" rtl="0" latinLnBrk="0">
+      <a:lvl3pPr marL="0" marR="0" indent="0" algn="ctr" defTabSz="584200" rtl="0" latinLnBrk="0">
         <a:lnSpc>
           <a:spcPct val="100000"/>
         </a:lnSpc>
@@ -2252,13 +2292,13 @@
             <a:srgbClr val="000000"/>
           </a:solidFill>
           <a:uFillTx/>
-          <a:latin typeface="+mn-lt"/>
-          <a:ea typeface="+mn-ea"/>
-          <a:cs typeface="+mn-cs"/>
+          <a:latin typeface="Helvetica Light"/>
+          <a:ea typeface="Helvetica Light"/>
+          <a:cs typeface="Helvetica Light"/>
           <a:sym typeface="Helvetica Light"/>
         </a:defRPr>
       </a:lvl3pPr>
-      <a:lvl4pPr marL="0" marR="0" indent="685800" algn="ctr" defTabSz="584200" rtl="0" latinLnBrk="0">
+      <a:lvl4pPr marL="0" marR="0" indent="0" algn="ctr" defTabSz="584200" rtl="0" latinLnBrk="0">
         <a:lnSpc>
           <a:spcPct val="100000"/>
         </a:lnSpc>
@@ -2281,13 +2321,13 @@
             <a:srgbClr val="000000"/>
           </a:solidFill>
           <a:uFillTx/>
-          <a:latin typeface="+mn-lt"/>
-          <a:ea typeface="+mn-ea"/>
-          <a:cs typeface="+mn-cs"/>
+          <a:latin typeface="Helvetica Light"/>
+          <a:ea typeface="Helvetica Light"/>
+          <a:cs typeface="Helvetica Light"/>
           <a:sym typeface="Helvetica Light"/>
         </a:defRPr>
       </a:lvl4pPr>
-      <a:lvl5pPr marL="0" marR="0" indent="914400" algn="ctr" defTabSz="584200" rtl="0" latinLnBrk="0">
+      <a:lvl5pPr marL="0" marR="0" indent="0" algn="ctr" defTabSz="584200" rtl="0" latinLnBrk="0">
         <a:lnSpc>
           <a:spcPct val="100000"/>
         </a:lnSpc>
@@ -2310,13 +2350,13 @@
             <a:srgbClr val="000000"/>
           </a:solidFill>
           <a:uFillTx/>
-          <a:latin typeface="+mn-lt"/>
-          <a:ea typeface="+mn-ea"/>
-          <a:cs typeface="+mn-cs"/>
+          <a:latin typeface="Helvetica Light"/>
+          <a:ea typeface="Helvetica Light"/>
+          <a:cs typeface="Helvetica Light"/>
           <a:sym typeface="Helvetica Light"/>
         </a:defRPr>
       </a:lvl5pPr>
-      <a:lvl6pPr marL="0" marR="0" indent="1143000" algn="ctr" defTabSz="584200" rtl="0" latinLnBrk="0">
+      <a:lvl6pPr marL="0" marR="0" indent="0" algn="ctr" defTabSz="584200" rtl="0" latinLnBrk="0">
         <a:lnSpc>
           <a:spcPct val="100000"/>
         </a:lnSpc>
@@ -2339,13 +2379,13 @@
             <a:srgbClr val="000000"/>
           </a:solidFill>
           <a:uFillTx/>
-          <a:latin typeface="+mn-lt"/>
-          <a:ea typeface="+mn-ea"/>
-          <a:cs typeface="+mn-cs"/>
+          <a:latin typeface="Helvetica Light"/>
+          <a:ea typeface="Helvetica Light"/>
+          <a:cs typeface="Helvetica Light"/>
           <a:sym typeface="Helvetica Light"/>
         </a:defRPr>
       </a:lvl6pPr>
-      <a:lvl7pPr marL="0" marR="0" indent="1371600" algn="ctr" defTabSz="584200" rtl="0" latinLnBrk="0">
+      <a:lvl7pPr marL="0" marR="0" indent="0" algn="ctr" defTabSz="584200" rtl="0" latinLnBrk="0">
         <a:lnSpc>
           <a:spcPct val="100000"/>
         </a:lnSpc>
@@ -2368,13 +2408,13 @@
             <a:srgbClr val="000000"/>
           </a:solidFill>
           <a:uFillTx/>
-          <a:latin typeface="+mn-lt"/>
-          <a:ea typeface="+mn-ea"/>
-          <a:cs typeface="+mn-cs"/>
+          <a:latin typeface="Helvetica Light"/>
+          <a:ea typeface="Helvetica Light"/>
+          <a:cs typeface="Helvetica Light"/>
           <a:sym typeface="Helvetica Light"/>
         </a:defRPr>
       </a:lvl7pPr>
-      <a:lvl8pPr marL="0" marR="0" indent="1600200" algn="ctr" defTabSz="584200" rtl="0" latinLnBrk="0">
+      <a:lvl8pPr marL="0" marR="0" indent="0" algn="ctr" defTabSz="584200" rtl="0" latinLnBrk="0">
         <a:lnSpc>
           <a:spcPct val="100000"/>
         </a:lnSpc>
@@ -2397,13 +2437,13 @@
             <a:srgbClr val="000000"/>
           </a:solidFill>
           <a:uFillTx/>
-          <a:latin typeface="+mn-lt"/>
-          <a:ea typeface="+mn-ea"/>
-          <a:cs typeface="+mn-cs"/>
+          <a:latin typeface="Helvetica Light"/>
+          <a:ea typeface="Helvetica Light"/>
+          <a:cs typeface="Helvetica Light"/>
           <a:sym typeface="Helvetica Light"/>
         </a:defRPr>
       </a:lvl8pPr>
-      <a:lvl9pPr marL="0" marR="0" indent="1828800" algn="ctr" defTabSz="584200" rtl="0" latinLnBrk="0">
+      <a:lvl9pPr marL="0" marR="0" indent="0" algn="ctr" defTabSz="584200" rtl="0" latinLnBrk="0">
         <a:lnSpc>
           <a:spcPct val="100000"/>
         </a:lnSpc>
@@ -2426,9 +2466,9 @@
             <a:srgbClr val="000000"/>
           </a:solidFill>
           <a:uFillTx/>
-          <a:latin typeface="+mn-lt"/>
-          <a:ea typeface="+mn-ea"/>
-          <a:cs typeface="+mn-cs"/>
+          <a:latin typeface="Helvetica Light"/>
+          <a:ea typeface="Helvetica Light"/>
+          <a:cs typeface="Helvetica Light"/>
           <a:sym typeface="Helvetica Light"/>
         </a:defRPr>
       </a:lvl9pPr>
@@ -2457,9 +2497,9 @@
             <a:srgbClr val="000000"/>
           </a:solidFill>
           <a:uFillTx/>
-          <a:latin typeface="+mn-lt"/>
-          <a:ea typeface="+mn-ea"/>
-          <a:cs typeface="+mn-cs"/>
+          <a:latin typeface="Helvetica Light"/>
+          <a:ea typeface="Helvetica Light"/>
+          <a:cs typeface="Helvetica Light"/>
           <a:sym typeface="Helvetica Light"/>
         </a:defRPr>
       </a:lvl1pPr>
@@ -2486,9 +2526,9 @@
             <a:srgbClr val="000000"/>
           </a:solidFill>
           <a:uFillTx/>
-          <a:latin typeface="+mn-lt"/>
-          <a:ea typeface="+mn-ea"/>
-          <a:cs typeface="+mn-cs"/>
+          <a:latin typeface="Helvetica Light"/>
+          <a:ea typeface="Helvetica Light"/>
+          <a:cs typeface="Helvetica Light"/>
           <a:sym typeface="Helvetica Light"/>
         </a:defRPr>
       </a:lvl2pPr>
@@ -2515,9 +2555,9 @@
             <a:srgbClr val="000000"/>
           </a:solidFill>
           <a:uFillTx/>
-          <a:latin typeface="+mn-lt"/>
-          <a:ea typeface="+mn-ea"/>
-          <a:cs typeface="+mn-cs"/>
+          <a:latin typeface="Helvetica Light"/>
+          <a:ea typeface="Helvetica Light"/>
+          <a:cs typeface="Helvetica Light"/>
           <a:sym typeface="Helvetica Light"/>
         </a:defRPr>
       </a:lvl3pPr>
@@ -2544,9 +2584,9 @@
             <a:srgbClr val="000000"/>
           </a:solidFill>
           <a:uFillTx/>
-          <a:latin typeface="+mn-lt"/>
-          <a:ea typeface="+mn-ea"/>
-          <a:cs typeface="+mn-cs"/>
+          <a:latin typeface="Helvetica Light"/>
+          <a:ea typeface="Helvetica Light"/>
+          <a:cs typeface="Helvetica Light"/>
           <a:sym typeface="Helvetica Light"/>
         </a:defRPr>
       </a:lvl4pPr>
@@ -2573,9 +2613,9 @@
             <a:srgbClr val="000000"/>
           </a:solidFill>
           <a:uFillTx/>
-          <a:latin typeface="+mn-lt"/>
-          <a:ea typeface="+mn-ea"/>
-          <a:cs typeface="+mn-cs"/>
+          <a:latin typeface="Helvetica Light"/>
+          <a:ea typeface="Helvetica Light"/>
+          <a:cs typeface="Helvetica Light"/>
           <a:sym typeface="Helvetica Light"/>
         </a:defRPr>
       </a:lvl5pPr>
@@ -2602,9 +2642,9 @@
             <a:srgbClr val="000000"/>
           </a:solidFill>
           <a:uFillTx/>
-          <a:latin typeface="+mn-lt"/>
-          <a:ea typeface="+mn-ea"/>
-          <a:cs typeface="+mn-cs"/>
+          <a:latin typeface="Helvetica Light"/>
+          <a:ea typeface="Helvetica Light"/>
+          <a:cs typeface="Helvetica Light"/>
           <a:sym typeface="Helvetica Light"/>
         </a:defRPr>
       </a:lvl6pPr>
@@ -2631,9 +2671,9 @@
             <a:srgbClr val="000000"/>
           </a:solidFill>
           <a:uFillTx/>
-          <a:latin typeface="+mn-lt"/>
-          <a:ea typeface="+mn-ea"/>
-          <a:cs typeface="+mn-cs"/>
+          <a:latin typeface="Helvetica Light"/>
+          <a:ea typeface="Helvetica Light"/>
+          <a:cs typeface="Helvetica Light"/>
           <a:sym typeface="Helvetica Light"/>
         </a:defRPr>
       </a:lvl7pPr>
@@ -2660,9 +2700,9 @@
             <a:srgbClr val="000000"/>
           </a:solidFill>
           <a:uFillTx/>
-          <a:latin typeface="+mn-lt"/>
-          <a:ea typeface="+mn-ea"/>
-          <a:cs typeface="+mn-cs"/>
+          <a:latin typeface="Helvetica Light"/>
+          <a:ea typeface="Helvetica Light"/>
+          <a:cs typeface="Helvetica Light"/>
           <a:sym typeface="Helvetica Light"/>
         </a:defRPr>
       </a:lvl8pPr>
@@ -2689,9 +2729,9 @@
             <a:srgbClr val="000000"/>
           </a:solidFill>
           <a:uFillTx/>
-          <a:latin typeface="+mn-lt"/>
-          <a:ea typeface="+mn-ea"/>
-          <a:cs typeface="+mn-cs"/>
+          <a:latin typeface="Helvetica Light"/>
+          <a:ea typeface="Helvetica Light"/>
+          <a:cs typeface="Helvetica Light"/>
           <a:sym typeface="Helvetica Light"/>
         </a:defRPr>
       </a:lvl9pPr>
@@ -2726,7 +2766,7 @@
           <a:sym typeface="Helvetica Light"/>
         </a:defRPr>
       </a:lvl1pPr>
-      <a:lvl2pPr marL="0" marR="0" indent="228600" algn="ctr" defTabSz="584200" rtl="0" latinLnBrk="0">
+      <a:lvl2pPr marL="0" marR="0" indent="0" algn="ctr" defTabSz="584200" rtl="0" latinLnBrk="0">
         <a:lnSpc>
           <a:spcPct val="100000"/>
         </a:lnSpc>
@@ -2755,7 +2795,7 @@
           <a:sym typeface="Helvetica Light"/>
         </a:defRPr>
       </a:lvl2pPr>
-      <a:lvl3pPr marL="0" marR="0" indent="457200" algn="ctr" defTabSz="584200" rtl="0" latinLnBrk="0">
+      <a:lvl3pPr marL="0" marR="0" indent="0" algn="ctr" defTabSz="584200" rtl="0" latinLnBrk="0">
         <a:lnSpc>
           <a:spcPct val="100000"/>
         </a:lnSpc>
@@ -2784,7 +2824,7 @@
           <a:sym typeface="Helvetica Light"/>
         </a:defRPr>
       </a:lvl3pPr>
-      <a:lvl4pPr marL="0" marR="0" indent="685800" algn="ctr" defTabSz="584200" rtl="0" latinLnBrk="0">
+      <a:lvl4pPr marL="0" marR="0" indent="0" algn="ctr" defTabSz="584200" rtl="0" latinLnBrk="0">
         <a:lnSpc>
           <a:spcPct val="100000"/>
         </a:lnSpc>
@@ -2813,7 +2853,7 @@
           <a:sym typeface="Helvetica Light"/>
         </a:defRPr>
       </a:lvl4pPr>
-      <a:lvl5pPr marL="0" marR="0" indent="914400" algn="ctr" defTabSz="584200" rtl="0" latinLnBrk="0">
+      <a:lvl5pPr marL="0" marR="0" indent="0" algn="ctr" defTabSz="584200" rtl="0" latinLnBrk="0">
         <a:lnSpc>
           <a:spcPct val="100000"/>
         </a:lnSpc>
@@ -2842,7 +2882,7 @@
           <a:sym typeface="Helvetica Light"/>
         </a:defRPr>
       </a:lvl5pPr>
-      <a:lvl6pPr marL="0" marR="0" indent="1143000" algn="ctr" defTabSz="584200" rtl="0" latinLnBrk="0">
+      <a:lvl6pPr marL="0" marR="0" indent="0" algn="ctr" defTabSz="584200" rtl="0" latinLnBrk="0">
         <a:lnSpc>
           <a:spcPct val="100000"/>
         </a:lnSpc>
@@ -2871,7 +2911,7 @@
           <a:sym typeface="Helvetica Light"/>
         </a:defRPr>
       </a:lvl6pPr>
-      <a:lvl7pPr marL="0" marR="0" indent="1371600" algn="ctr" defTabSz="584200" rtl="0" latinLnBrk="0">
+      <a:lvl7pPr marL="0" marR="0" indent="0" algn="ctr" defTabSz="584200" rtl="0" latinLnBrk="0">
         <a:lnSpc>
           <a:spcPct val="100000"/>
         </a:lnSpc>
@@ -2900,7 +2940,7 @@
           <a:sym typeface="Helvetica Light"/>
         </a:defRPr>
       </a:lvl7pPr>
-      <a:lvl8pPr marL="0" marR="0" indent="1600200" algn="ctr" defTabSz="584200" rtl="0" latinLnBrk="0">
+      <a:lvl8pPr marL="0" marR="0" indent="0" algn="ctr" defTabSz="584200" rtl="0" latinLnBrk="0">
         <a:lnSpc>
           <a:spcPct val="100000"/>
         </a:lnSpc>
@@ -2929,7 +2969,7 @@
           <a:sym typeface="Helvetica Light"/>
         </a:defRPr>
       </a:lvl8pPr>
-      <a:lvl9pPr marL="0" marR="0" indent="1828800" algn="ctr" defTabSz="584200" rtl="0" latinLnBrk="0">
+      <a:lvl9pPr marL="0" marR="0" indent="0" algn="ctr" defTabSz="584200" rtl="0" latinLnBrk="0">
         <a:lnSpc>
           <a:spcPct val="100000"/>
         </a:lnSpc>
@@ -3028,6 +3068,35 @@
           </a:p>
         </p:txBody>
       </p:sp>
+      <p:pic>
+        <p:nvPicPr>
+          <p:cNvPr id="121" name="Golang.png"/>
+          <p:cNvPicPr>
+            <a:picLocks noChangeAspect="1"/>
+          </p:cNvPicPr>
+          <p:nvPr/>
+        </p:nvPicPr>
+        <p:blipFill>
+          <a:blip r:embed="rId2">
+            <a:extLst/>
+          </a:blip>
+          <a:stretch>
+            <a:fillRect/>
+          </a:stretch>
+        </p:blipFill>
+        <p:spPr>
+          <a:xfrm>
+            <a:off x="1987550" y="6248400"/>
+            <a:ext cx="7741495" cy="2782891"/>
+          </a:xfrm>
+          <a:prstGeom prst="rect">
+            <a:avLst/>
+          </a:prstGeom>
+          <a:ln w="12700">
+            <a:miter lim="400000"/>
+          </a:ln>
+        </p:spPr>
+      </p:pic>
     </p:spTree>
   </p:cSld>
   <p:clrMapOvr>
@@ -3056,7 +3125,7 @@
       </p:grpSpPr>
       <p:sp>
         <p:nvSpPr>
-          <p:cNvPr id="122" name="Shape 122"/>
+          <p:cNvPr id="123" name="Shape 123"/>
           <p:cNvSpPr/>
           <p:nvPr>
             <p:ph type="title"/>
@@ -3080,7 +3149,7 @@
       </p:sp>
       <p:sp>
         <p:nvSpPr>
-          <p:cNvPr id="123" name="Shape 123"/>
+          <p:cNvPr id="124" name="Shape 124"/>
           <p:cNvSpPr/>
           <p:nvPr>
             <p:ph type="body" idx="1"/>
@@ -3121,7 +3190,7 @@
           <a:p>
             <a:pPr/>
             <a:r>
-              <a:t>C-Family of languages</a:t>
+              <a:t>C style language</a:t>
             </a:r>
           </a:p>
         </p:txBody>
@@ -3154,7 +3223,7 @@
       </p:grpSpPr>
       <p:pic>
         <p:nvPicPr>
-          <p:cNvPr id="125" name="rip-tombstone-md.png"/>
+          <p:cNvPr id="126" name="image2.png"/>
           <p:cNvPicPr>
             <a:picLocks noChangeAspect="1"/>
           </p:cNvPicPr>
@@ -3170,8 +3239,8 @@
         </p:blipFill>
         <p:spPr>
           <a:xfrm>
-            <a:off x="7818657" y="1658672"/>
-            <a:ext cx="5128049" cy="6309822"/>
+            <a:off x="7818656" y="1658672"/>
+            <a:ext cx="5128050" cy="6309822"/>
           </a:xfrm>
           <a:prstGeom prst="rect">
             <a:avLst/>
@@ -3183,7 +3252,7 @@
       </p:pic>
       <p:pic>
         <p:nvPicPr>
-          <p:cNvPr id="126" name="rip-tombstone-md.png"/>
+          <p:cNvPr id="127" name="image2.png"/>
           <p:cNvPicPr>
             <a:picLocks noChangeAspect="1"/>
           </p:cNvPicPr>
@@ -3199,8 +3268,8 @@
         </p:blipFill>
         <p:spPr>
           <a:xfrm>
-            <a:off x="397536" y="2581539"/>
-            <a:ext cx="3917814" cy="4820684"/>
+            <a:off x="397536" y="2581538"/>
+            <a:ext cx="3917814" cy="4820685"/>
           </a:xfrm>
           <a:prstGeom prst="rect">
             <a:avLst/>
@@ -3212,7 +3281,7 @@
       </p:pic>
       <p:pic>
         <p:nvPicPr>
-          <p:cNvPr id="127" name="rip-tombstone-md.png"/>
+          <p:cNvPr id="128" name="image2.png"/>
           <p:cNvPicPr>
             <a:picLocks noChangeAspect="1"/>
           </p:cNvPicPr>
@@ -3229,7 +3298,7 @@
         <p:spPr>
           <a:xfrm>
             <a:off x="4239550" y="4748224"/>
-            <a:ext cx="3917814" cy="4820685"/>
+            <a:ext cx="3917815" cy="4820685"/>
           </a:xfrm>
           <a:prstGeom prst="rect">
             <a:avLst/>
@@ -3241,7 +3310,7 @@
       </p:pic>
       <p:pic>
         <p:nvPicPr>
-          <p:cNvPr id="128" name="shield-with-beta.png"/>
+          <p:cNvPr id="129" name="image3.png"/>
           <p:cNvPicPr>
             <a:picLocks noChangeAspect="1"/>
           </p:cNvPicPr>
@@ -3257,8 +3326,8 @@
         </p:blipFill>
         <p:spPr>
           <a:xfrm>
-            <a:off x="397536" y="4606448"/>
-            <a:ext cx="3917814" cy="2350689"/>
+            <a:off x="397536" y="4606447"/>
+            <a:ext cx="3917814" cy="2350690"/>
           </a:xfrm>
           <a:prstGeom prst="rect">
             <a:avLst/>
@@ -3270,7 +3339,7 @@
       </p:pic>
       <p:pic>
         <p:nvPicPr>
-          <p:cNvPr id="129" name="gwt-logo.png"/>
+          <p:cNvPr id="130" name="image4.png"/>
           <p:cNvPicPr>
             <a:picLocks noChangeAspect="1"/>
           </p:cNvPicPr>
@@ -3287,7 +3356,7 @@
         <p:spPr>
           <a:xfrm>
             <a:off x="8564740" y="4433396"/>
-            <a:ext cx="3321972" cy="3155874"/>
+            <a:ext cx="3321973" cy="3155875"/>
           </a:xfrm>
           <a:prstGeom prst="rect">
             <a:avLst/>
@@ -3299,13 +3368,13 @@
       </p:pic>
       <p:sp>
         <p:nvSpPr>
-          <p:cNvPr id="130" name="Shape 130"/>
+          <p:cNvPr id="131" name="Shape 131"/>
           <p:cNvSpPr/>
           <p:nvPr/>
         </p:nvSpPr>
         <p:spPr>
           <a:xfrm>
-            <a:off x="1981507" y="6076950"/>
+            <a:off x="1981506" y="6076949"/>
             <a:ext cx="749872" cy="647701"/>
           </a:xfrm>
           <a:prstGeom prst="rect">
@@ -3330,9 +3399,9 @@
                 <a:solidFill>
                   <a:srgbClr val="FFFFFF"/>
                 </a:solidFill>
-                <a:latin typeface="Helvetica"/>
-                <a:ea typeface="Helvetica"/>
-                <a:cs typeface="Helvetica"/>
+                <a:latin typeface="+mj-lt"/>
+                <a:ea typeface="+mj-ea"/>
+                <a:cs typeface="+mj-cs"/>
                 <a:sym typeface="Helvetica"/>
               </a:defRPr>
             </a:lvl1pPr>
@@ -3347,7 +3416,7 @@
       </p:sp>
       <p:pic>
         <p:nvPicPr>
-          <p:cNvPr id="131" name="dart-logo-wordmark-1200w.png"/>
+          <p:cNvPr id="132" name="image5.png"/>
           <p:cNvPicPr>
             <a:picLocks noChangeAspect="1"/>
           </p:cNvPicPr>
@@ -3363,8 +3432,8 @@
         </p:blipFill>
         <p:spPr>
           <a:xfrm>
-            <a:off x="4937754" y="7066679"/>
-            <a:ext cx="2521406" cy="1891055"/>
+            <a:off x="4937754" y="7066678"/>
+            <a:ext cx="2521407" cy="1891056"/>
           </a:xfrm>
           <a:prstGeom prst="rect">
             <a:avLst/>
@@ -3376,13 +3445,17 @@
       </p:pic>
       <p:sp>
         <p:nvSpPr>
-          <p:cNvPr id="132" name="Shape 132"/>
+          <p:cNvPr id="133" name="Shape 133"/>
           <p:cNvSpPr/>
           <p:nvPr>
             <p:ph type="title"/>
           </p:nvPr>
         </p:nvSpPr>
         <p:spPr>
+          <a:xfrm>
+            <a:off x="952500" y="-63500"/>
+            <a:ext cx="11099800" cy="2159000"/>
+          </a:xfrm>
           <a:prstGeom prst="rect">
             <a:avLst/>
           </a:prstGeom>
@@ -3391,7 +3464,7 @@
           <a:bodyPr/>
           <a:lstStyle>
             <a:lvl1pPr defTabSz="490727">
-              <a:defRPr sz="6719"/>
+              <a:defRPr sz="6700"/>
             </a:lvl1pPr>
           </a:lstStyle>
           <a:p>
@@ -3430,7 +3503,7 @@
       </p:grpSpPr>
       <p:pic>
         <p:nvPicPr>
-          <p:cNvPr id="134" name="KuDr42X_ITXghJhSInDZekNEF0jLt3NeVxtRye3tqco.png"/>
+          <p:cNvPr id="135" name="image6.png"/>
           <p:cNvPicPr>
             <a:picLocks noChangeAspect="1"/>
           </p:cNvPicPr>
@@ -3446,8 +3519,8 @@
         </p:blipFill>
         <p:spPr>
           <a:xfrm>
-            <a:off x="-1" y="2321983"/>
-            <a:ext cx="13004801" cy="4417035"/>
+            <a:off x="-2" y="2321983"/>
+            <a:ext cx="13004803" cy="4417036"/>
           </a:xfrm>
           <a:prstGeom prst="rect">
             <a:avLst/>
@@ -3485,7 +3558,7 @@
       </p:grpSpPr>
       <p:sp>
         <p:nvSpPr>
-          <p:cNvPr id="136" name="Shape 136"/>
+          <p:cNvPr id="137" name="Shape 137"/>
           <p:cNvSpPr/>
           <p:nvPr>
             <p:ph type="title"/>
@@ -3499,8 +3572,8 @@
         <p:txBody>
           <a:bodyPr/>
           <a:lstStyle>
-            <a:lvl1pPr defTabSz="514095">
-              <a:defRPr sz="7040"/>
+            <a:lvl1pPr defTabSz="514094">
+              <a:defRPr sz="7000"/>
             </a:lvl1pPr>
           </a:lstStyle>
           <a:p>
@@ -3513,7 +3586,7 @@
       </p:sp>
       <p:sp>
         <p:nvSpPr>
-          <p:cNvPr id="137" name="Shape 137"/>
+          <p:cNvPr id="138" name="Shape 138"/>
           <p:cNvSpPr/>
           <p:nvPr>
             <p:ph type="body" idx="1"/>
@@ -3549,6 +3622,138 @@
             <a:pPr/>
             <a:r>
               <a:t>Store and retrieve JSON documents</a:t>
+            </a:r>
+          </a:p>
+        </p:txBody>
+      </p:sp>
+    </p:spTree>
+  </p:cSld>
+  <p:clrMapOvr>
+    <a:masterClrMapping/>
+  </p:clrMapOvr>
+  <p:transition xmlns:p14="http://schemas.microsoft.com/office/powerpoint/2010/main" spd="med" advClick="1" p14:dur="1000"/>
+</p:sld>
+</file>
+
+<file path=ppt/slides/slide6.xml><?xml version="1.0" encoding="utf-8"?>
+<p:sld xmlns:a="http://schemas.openxmlformats.org/drawingml/2006/main" xmlns:r="http://schemas.openxmlformats.org/officeDocument/2006/relationships" xmlns:p="http://schemas.openxmlformats.org/presentationml/2006/main" showMasterSp="1" showMasterPhAnim="1">
+  <p:cSld>
+    <p:spTree>
+      <p:nvGrpSpPr>
+        <p:cNvPr id="1" name=""/>
+        <p:cNvGrpSpPr/>
+        <p:nvPr/>
+      </p:nvGrpSpPr>
+      <p:grpSpPr>
+        <a:xfrm>
+          <a:off x="0" y="0"/>
+          <a:ext cx="0" cy="0"/>
+          <a:chOff x="0" y="0"/>
+          <a:chExt cx="0" cy="0"/>
+        </a:xfrm>
+      </p:grpSpPr>
+      <p:sp>
+        <p:nvSpPr>
+          <p:cNvPr id="140" name="Shape 140"/>
+          <p:cNvSpPr/>
+          <p:nvPr>
+            <p:ph type="title"/>
+          </p:nvPr>
+        </p:nvSpPr>
+        <p:spPr>
+          <a:prstGeom prst="rect">
+            <a:avLst/>
+          </a:prstGeom>
+        </p:spPr>
+        <p:txBody>
+          <a:bodyPr/>
+          <a:lstStyle>
+            <a:lvl1pPr defTabSz="490727">
+              <a:defRPr sz="6719"/>
+            </a:lvl1pPr>
+          </a:lstStyle>
+          <a:p>
+            <a:pPr/>
+            <a:r>
+              <a:t>Resources</a:t>
+            </a:r>
+          </a:p>
+        </p:txBody>
+      </p:sp>
+      <p:sp>
+        <p:nvSpPr>
+          <p:cNvPr id="141" name="Shape 141"/>
+          <p:cNvSpPr/>
+          <p:nvPr>
+            <p:ph type="body" idx="1"/>
+          </p:nvPr>
+        </p:nvSpPr>
+        <p:spPr>
+          <a:prstGeom prst="rect">
+            <a:avLst/>
+          </a:prstGeom>
+        </p:spPr>
+        <p:txBody>
+          <a:bodyPr/>
+          <a:lstStyle/>
+          <a:p>
+            <a:pPr/>
+            <a:r>
+              <a:t>Home </a:t>
+            </a:r>
+            <a:r>
+              <a:rPr u="sng">
+                <a:solidFill>
+                  <a:srgbClr val="0000FF"/>
+                </a:solidFill>
+                <a:uFill>
+                  <a:solidFill>
+                    <a:srgbClr val="0000FF"/>
+                  </a:solidFill>
+                </a:uFill>
+                <a:hlinkClick r:id="rId2" invalidUrl="" action="" tgtFrame="" tooltip="" history="1" highlightClick="0" endSnd="0"/>
+              </a:rPr>
+              <a:t>https://golang.org</a:t>
+            </a:r>
+          </a:p>
+          <a:p>
+            <a:pPr/>
+            <a:r>
+              <a:t>Interactive tutorial </a:t>
+            </a:r>
+            <a:r>
+              <a:rPr u="sng">
+                <a:solidFill>
+                  <a:srgbClr val="0000FF"/>
+                </a:solidFill>
+                <a:uFill>
+                  <a:solidFill>
+                    <a:srgbClr val="0000FF"/>
+                  </a:solidFill>
+                </a:uFill>
+                <a:hlinkClick r:id="rId3" invalidUrl="" action="" tgtFrame="" tooltip="" history="1" highlightClick="0" endSnd="0"/>
+              </a:rPr>
+              <a:t>https://tour.golang.org/</a:t>
+            </a:r>
+          </a:p>
+          <a:p>
+            <a:pPr/>
+            <a:r>
+              <a:t>Docker github page </a:t>
+            </a:r>
+            <a:r>
+              <a:rPr u="sng">
+                <a:solidFill>
+                  <a:srgbClr val="0000FF"/>
+                </a:solidFill>
+                <a:uFill>
+                  <a:solidFill>
+                    <a:srgbClr val="0000FF"/>
+                  </a:solidFill>
+                </a:uFill>
+                <a:hlinkClick r:id="rId4" invalidUrl="" action="" tgtFrame="" tooltip="" history="1" highlightClick="0" endSnd="0"/>
+              </a:rPr>
+              <a:t>https://github.com/docker/docker</a:t>
             </a:r>
           </a:p>
         </p:txBody>
@@ -3573,10 +3778,10 @@
         <a:srgbClr val="FFFFFF"/>
       </a:lt1>
       <a:dk2>
-        <a:srgbClr val="53585F"/>
+        <a:srgbClr val="A7A7A7"/>
       </a:dk2>
       <a:lt2>
-        <a:srgbClr val="DCDEE0"/>
+        <a:srgbClr val="535353"/>
       </a:lt2>
       <a:accent1>
         <a:srgbClr val="0365C0"/>
@@ -3605,14 +3810,14 @@
     </a:clrScheme>
     <a:fontScheme name="White">
       <a:majorFont>
-        <a:latin typeface="Helvetica Light"/>
-        <a:ea typeface="Helvetica Light"/>
-        <a:cs typeface="Helvetica Light"/>
+        <a:latin typeface="Helvetica"/>
+        <a:ea typeface="Helvetica"/>
+        <a:cs typeface="Helvetica"/>
       </a:majorFont>
       <a:minorFont>
-        <a:latin typeface="Helvetica Light"/>
-        <a:ea typeface="Helvetica Light"/>
-        <a:cs typeface="Helvetica Light"/>
+        <a:latin typeface="Helvetica Neue"/>
+        <a:ea typeface="Helvetica Neue"/>
+        <a:cs typeface="Helvetica Neue"/>
       </a:minorFont>
     </a:fontScheme>
     <a:fmtScheme name="White">
@@ -3698,7 +3903,7 @@
         </a:effectStyle>
         <a:effectStyle>
           <a:effectLst>
-            <a:outerShdw sx="100000" sy="100000" kx="0" ky="0" algn="b" rotWithShape="0" blurRad="50800" dist="12700" dir="0">
+            <a:outerShdw sx="100000" sy="100000" kx="0" ky="0" algn="b" rotWithShape="0" blurRad="38100" dist="25400" dir="5400000">
               <a:srgbClr val="000000">
                 <a:alpha val="50000"/>
               </a:srgbClr>
@@ -3770,14 +3975,15 @@
   <a:objectDefaults>
     <a:spDef>
       <a:spPr>
-        <a:blipFill rotWithShape="1">
-          <a:blip r:embed="rId1"/>
-          <a:srcRect l="0" t="0" r="0" b="0"/>
-          <a:tile tx="0" ty="0" sx="100000" sy="100000" flip="none" algn="tl"/>
-        </a:blipFill>
-        <a:ln w="12700" cap="flat">
-          <a:noFill/>
-          <a:miter lim="400000"/>
+        <a:solidFill>
+          <a:srgbClr val="FFFFFF"/>
+        </a:solidFill>
+        <a:ln w="25400" cap="flat">
+          <a:solidFill>
+            <a:schemeClr val="accent1"/>
+          </a:solidFill>
+          <a:prstDash val="solid"/>
+          <a:round/>
         </a:ln>
         <a:effectLst>
           <a:outerShdw sx="100000" sy="100000" kx="0" ky="0" algn="b" rotWithShape="0" blurRad="38100" dist="25400" dir="5400000">
@@ -3807,18 +4013,18 @@
           <a:buFontTx/>
           <a:buNone/>
           <a:tabLst/>
-          <a:defRPr b="0" baseline="0" cap="none" i="0" spc="0" strike="noStrike" sz="2400" u="none" kumimoji="0" normalizeH="0">
+          <a:defRPr b="0" baseline="0" cap="none" i="0" spc="0" strike="noStrike" sz="3600" u="none" kumimoji="0" normalizeH="0">
             <a:ln>
               <a:noFill/>
             </a:ln>
             <a:solidFill>
-              <a:srgbClr val="FFFFFF"/>
+              <a:srgbClr val="000000"/>
             </a:solidFill>
             <a:effectLst/>
             <a:uFillTx/>
-            <a:latin typeface="+mn-lt"/>
-            <a:ea typeface="+mn-ea"/>
-            <a:cs typeface="+mn-cs"/>
+            <a:latin typeface="Helvetica Light"/>
+            <a:ea typeface="Helvetica Light"/>
+            <a:cs typeface="Helvetica Light"/>
             <a:sym typeface="Helvetica Light"/>
           </a:defRPr>
         </a:defPPr>
@@ -4069,12 +4275,18 @@
         <a:noFill/>
         <a:ln w="25400" cap="flat">
           <a:solidFill>
-            <a:srgbClr val="000000"/>
+            <a:schemeClr val="accent1"/>
           </a:solidFill>
           <a:prstDash val="solid"/>
-          <a:miter lim="400000"/>
+          <a:round/>
         </a:ln>
-        <a:effectLst/>
+        <a:effectLst>
+          <a:outerShdw sx="100000" sy="100000" kx="0" ky="0" algn="b" rotWithShape="0" blurRad="38100" dist="25400" dir="5400000">
+            <a:srgbClr val="000000">
+              <a:alpha val="50000"/>
+            </a:srgbClr>
+          </a:outerShdw>
+        </a:effectLst>
         <a:sp3d/>
       </a:spPr>
       <a:bodyPr rot="0" spcFirstLastPara="1" vertOverflow="overflow" horzOverflow="overflow" vert="horz" wrap="square" lIns="91439" tIns="45719" rIns="91439" bIns="45719" numCol="1" spcCol="38100" rtlCol="0" anchor="t" upright="0">
@@ -4387,9 +4599,9 @@
             </a:solidFill>
             <a:effectLst/>
             <a:uFillTx/>
-            <a:latin typeface="+mn-lt"/>
-            <a:ea typeface="+mn-ea"/>
-            <a:cs typeface="+mn-cs"/>
+            <a:latin typeface="Helvetica Light"/>
+            <a:ea typeface="Helvetica Light"/>
+            <a:cs typeface="Helvetica Light"/>
             <a:sym typeface="Helvetica Light"/>
           </a:defRPr>
         </a:defPPr>
@@ -4650,10 +4862,10 @@
         <a:srgbClr val="FFFFFF"/>
       </a:lt1>
       <a:dk2>
-        <a:srgbClr val="53585F"/>
+        <a:srgbClr val="A7A7A7"/>
       </a:dk2>
       <a:lt2>
-        <a:srgbClr val="DCDEE0"/>
+        <a:srgbClr val="535353"/>
       </a:lt2>
       <a:accent1>
         <a:srgbClr val="0365C0"/>
@@ -4682,14 +4894,14 @@
     </a:clrScheme>
     <a:fontScheme name="White">
       <a:majorFont>
-        <a:latin typeface="Helvetica Light"/>
-        <a:ea typeface="Helvetica Light"/>
-        <a:cs typeface="Helvetica Light"/>
+        <a:latin typeface="Helvetica"/>
+        <a:ea typeface="Helvetica"/>
+        <a:cs typeface="Helvetica"/>
       </a:majorFont>
       <a:minorFont>
-        <a:latin typeface="Helvetica Light"/>
-        <a:ea typeface="Helvetica Light"/>
-        <a:cs typeface="Helvetica Light"/>
+        <a:latin typeface="Helvetica Neue"/>
+        <a:ea typeface="Helvetica Neue"/>
+        <a:cs typeface="Helvetica Neue"/>
       </a:minorFont>
     </a:fontScheme>
     <a:fmtScheme name="White">
@@ -4775,7 +4987,7 @@
         </a:effectStyle>
         <a:effectStyle>
           <a:effectLst>
-            <a:outerShdw sx="100000" sy="100000" kx="0" ky="0" algn="b" rotWithShape="0" blurRad="50800" dist="12700" dir="0">
+            <a:outerShdw sx="100000" sy="100000" kx="0" ky="0" algn="b" rotWithShape="0" blurRad="38100" dist="25400" dir="5400000">
               <a:srgbClr val="000000">
                 <a:alpha val="50000"/>
               </a:srgbClr>
@@ -4847,14 +5059,15 @@
   <a:objectDefaults>
     <a:spDef>
       <a:spPr>
-        <a:blipFill rotWithShape="1">
-          <a:blip r:embed="rId1"/>
-          <a:srcRect l="0" t="0" r="0" b="0"/>
-          <a:tile tx="0" ty="0" sx="100000" sy="100000" flip="none" algn="tl"/>
-        </a:blipFill>
-        <a:ln w="12700" cap="flat">
-          <a:noFill/>
-          <a:miter lim="400000"/>
+        <a:solidFill>
+          <a:srgbClr val="FFFFFF"/>
+        </a:solidFill>
+        <a:ln w="25400" cap="flat">
+          <a:solidFill>
+            <a:schemeClr val="accent1"/>
+          </a:solidFill>
+          <a:prstDash val="solid"/>
+          <a:round/>
         </a:ln>
         <a:effectLst>
           <a:outerShdw sx="100000" sy="100000" kx="0" ky="0" algn="b" rotWithShape="0" blurRad="38100" dist="25400" dir="5400000">
@@ -4884,18 +5097,18 @@
           <a:buFontTx/>
           <a:buNone/>
           <a:tabLst/>
-          <a:defRPr b="0" baseline="0" cap="none" i="0" spc="0" strike="noStrike" sz="2400" u="none" kumimoji="0" normalizeH="0">
+          <a:defRPr b="0" baseline="0" cap="none" i="0" spc="0" strike="noStrike" sz="3600" u="none" kumimoji="0" normalizeH="0">
             <a:ln>
               <a:noFill/>
             </a:ln>
             <a:solidFill>
-              <a:srgbClr val="FFFFFF"/>
+              <a:srgbClr val="000000"/>
             </a:solidFill>
             <a:effectLst/>
             <a:uFillTx/>
-            <a:latin typeface="+mn-lt"/>
-            <a:ea typeface="+mn-ea"/>
-            <a:cs typeface="+mn-cs"/>
+            <a:latin typeface="Helvetica Light"/>
+            <a:ea typeface="Helvetica Light"/>
+            <a:cs typeface="Helvetica Light"/>
             <a:sym typeface="Helvetica Light"/>
           </a:defRPr>
         </a:defPPr>
@@ -5146,12 +5359,18 @@
         <a:noFill/>
         <a:ln w="25400" cap="flat">
           <a:solidFill>
-            <a:srgbClr val="000000"/>
+            <a:schemeClr val="accent1"/>
           </a:solidFill>
           <a:prstDash val="solid"/>
-          <a:miter lim="400000"/>
+          <a:round/>
         </a:ln>
-        <a:effectLst/>
+        <a:effectLst>
+          <a:outerShdw sx="100000" sy="100000" kx="0" ky="0" algn="b" rotWithShape="0" blurRad="38100" dist="25400" dir="5400000">
+            <a:srgbClr val="000000">
+              <a:alpha val="50000"/>
+            </a:srgbClr>
+          </a:outerShdw>
+        </a:effectLst>
         <a:sp3d/>
       </a:spPr>
       <a:bodyPr rot="0" spcFirstLastPara="1" vertOverflow="overflow" horzOverflow="overflow" vert="horz" wrap="square" lIns="91439" tIns="45719" rIns="91439" bIns="45719" numCol="1" spcCol="38100" rtlCol="0" anchor="t" upright="0">
@@ -5464,9 +5683,9 @@
             </a:solidFill>
             <a:effectLst/>
             <a:uFillTx/>
-            <a:latin typeface="+mn-lt"/>
-            <a:ea typeface="+mn-ea"/>
-            <a:cs typeface="+mn-cs"/>
+            <a:latin typeface="Helvetica Light"/>
+            <a:ea typeface="Helvetica Light"/>
+            <a:cs typeface="Helvetica Light"/>
             <a:sym typeface="Helvetica Light"/>
           </a:defRPr>
         </a:defPPr>

</xml_diff>